<commit_message>
added videos to lessons
</commit_message>
<xml_diff>
--- a/Unit 1 - Figure Drawing and Illustration/Lesson 1.1.pptx
+++ b/Unit 1 - Figure Drawing and Illustration/Lesson 1.1.pptx
@@ -12,7 +12,8 @@
     <p:sldId id="260" r:id="rId9"/>
     <p:sldId id="261" r:id="rId10"/>
     <p:sldId id="262" r:id="rId11"/>
-    <p:sldId id="263" r:id="rId12"/>
+    <p:sldId id="264" r:id="rId12"/>
+    <p:sldId id="263" r:id="rId13"/>
   </p:sldIdLst>
   <p:sldSz cx="12192000" cy="6858000"/>
   <p:notesSz cx="6858000" cy="9144000"/>
@@ -121,6 +122,38 @@
 
 <file path=ppt/changesInfos/changesInfo1.xml><?xml version="1.0" encoding="utf-8"?>
 <pc:chgInfo xmlns:a="http://schemas.openxmlformats.org/drawingml/2006/main" xmlns:r="http://schemas.openxmlformats.org/officeDocument/2006/relationships" xmlns:ac="http://schemas.microsoft.com/office/drawing/2013/main/command" xmlns:pc="http://schemas.microsoft.com/office/powerpoint/2013/main/command">
+  <pc:docChgLst>
+    <pc:chgData name="Jessica Kipp" userId="9a674628-791e-40a8-b488-ce9d719fd0a5" providerId="ADAL" clId="{CCFE8EC6-860D-44A6-A0F5-AED4869A09CD}"/>
+    <pc:docChg chg="addSld modSld">
+      <pc:chgData name="Jessica Kipp" userId="9a674628-791e-40a8-b488-ce9d719fd0a5" providerId="ADAL" clId="{CCFE8EC6-860D-44A6-A0F5-AED4869A09CD}" dt="2022-04-20T14:56:04.310" v="12" actId="20577"/>
+      <pc:docMkLst>
+        <pc:docMk/>
+      </pc:docMkLst>
+      <pc:sldChg chg="modSp add">
+        <pc:chgData name="Jessica Kipp" userId="9a674628-791e-40a8-b488-ce9d719fd0a5" providerId="ADAL" clId="{CCFE8EC6-860D-44A6-A0F5-AED4869A09CD}" dt="2022-04-20T14:56:04.310" v="12" actId="20577"/>
+        <pc:sldMkLst>
+          <pc:docMk/>
+          <pc:sldMk cId="1805634789" sldId="264"/>
+        </pc:sldMkLst>
+        <pc:spChg chg="mod">
+          <ac:chgData name="Jessica Kipp" userId="9a674628-791e-40a8-b488-ce9d719fd0a5" providerId="ADAL" clId="{CCFE8EC6-860D-44A6-A0F5-AED4869A09CD}" dt="2022-04-20T14:56:01.217" v="10" actId="20577"/>
+          <ac:spMkLst>
+            <pc:docMk/>
+            <pc:sldMk cId="1805634789" sldId="264"/>
+            <ac:spMk id="2" creationId="{1328FB4C-BF32-496F-A899-53BF5F0FD667}"/>
+          </ac:spMkLst>
+        </pc:spChg>
+        <pc:spChg chg="mod">
+          <ac:chgData name="Jessica Kipp" userId="9a674628-791e-40a8-b488-ce9d719fd0a5" providerId="ADAL" clId="{CCFE8EC6-860D-44A6-A0F5-AED4869A09CD}" dt="2022-04-20T14:56:04.310" v="12" actId="20577"/>
+          <ac:spMkLst>
+            <pc:docMk/>
+            <pc:sldMk cId="1805634789" sldId="264"/>
+            <ac:spMk id="3" creationId="{0E2FD9DE-6E07-422C-8C70-8CC6DDFE4BE8}"/>
+          </ac:spMkLst>
+        </pc:spChg>
+      </pc:sldChg>
+    </pc:docChg>
+  </pc:docChgLst>
   <pc:docChgLst>
     <pc:chgData name="Kipp, Jessica" userId="9a674628-791e-40a8-b488-ce9d719fd0a5" providerId="ADAL" clId="{67041843-35D2-46F3-B48D-AE7570851F93}"/>
     <pc:docChg chg="undo custSel addSld delSld modSld">
@@ -542,7 +575,7 @@
           <a:p>
             <a:fld id="{3C76CBDD-196E-46E7-91AC-BD7B7925F7DA}" type="datetimeFigureOut">
               <a:rPr lang="en-US" smtClean="0"/>
-              <a:t>4/19/2022</a:t>
+              <a:t>4/20/2022</a:t>
             </a:fld>
             <a:endParaRPr lang="en-US"/>
           </a:p>
@@ -753,7 +786,7 @@
           <a:p>
             <a:fld id="{3C76CBDD-196E-46E7-91AC-BD7B7925F7DA}" type="datetimeFigureOut">
               <a:rPr lang="en-US" smtClean="0"/>
-              <a:t>4/19/2022</a:t>
+              <a:t>4/20/2022</a:t>
             </a:fld>
             <a:endParaRPr lang="en-US"/>
           </a:p>
@@ -968,7 +1001,7 @@
           <a:p>
             <a:fld id="{3C76CBDD-196E-46E7-91AC-BD7B7925F7DA}" type="datetimeFigureOut">
               <a:rPr lang="en-US" smtClean="0"/>
-              <a:t>4/19/2022</a:t>
+              <a:t>4/20/2022</a:t>
             </a:fld>
             <a:endParaRPr lang="en-US"/>
           </a:p>
@@ -1169,7 +1202,7 @@
           <a:p>
             <a:fld id="{3C76CBDD-196E-46E7-91AC-BD7B7925F7DA}" type="datetimeFigureOut">
               <a:rPr lang="en-US" smtClean="0"/>
-              <a:t>4/19/2022</a:t>
+              <a:t>4/20/2022</a:t>
             </a:fld>
             <a:endParaRPr lang="en-US"/>
           </a:p>
@@ -1448,7 +1481,7 @@
           <a:p>
             <a:fld id="{3C76CBDD-196E-46E7-91AC-BD7B7925F7DA}" type="datetimeFigureOut">
               <a:rPr lang="en-US" smtClean="0"/>
-              <a:t>4/19/2022</a:t>
+              <a:t>4/20/2022</a:t>
             </a:fld>
             <a:endParaRPr lang="en-US"/>
           </a:p>
@@ -1716,7 +1749,7 @@
           <a:p>
             <a:fld id="{3C76CBDD-196E-46E7-91AC-BD7B7925F7DA}" type="datetimeFigureOut">
               <a:rPr lang="en-US" smtClean="0"/>
-              <a:t>4/19/2022</a:t>
+              <a:t>4/20/2022</a:t>
             </a:fld>
             <a:endParaRPr lang="en-US"/>
           </a:p>
@@ -2132,7 +2165,7 @@
           <a:p>
             <a:fld id="{3C76CBDD-196E-46E7-91AC-BD7B7925F7DA}" type="datetimeFigureOut">
               <a:rPr lang="en-US" smtClean="0"/>
-              <a:t>4/19/2022</a:t>
+              <a:t>4/20/2022</a:t>
             </a:fld>
             <a:endParaRPr lang="en-US"/>
           </a:p>
@@ -2281,7 +2314,7 @@
           <a:p>
             <a:fld id="{3C76CBDD-196E-46E7-91AC-BD7B7925F7DA}" type="datetimeFigureOut">
               <a:rPr lang="en-US" smtClean="0"/>
-              <a:t>4/19/2022</a:t>
+              <a:t>4/20/2022</a:t>
             </a:fld>
             <a:endParaRPr lang="en-US"/>
           </a:p>
@@ -2407,7 +2440,7 @@
           <a:p>
             <a:fld id="{3C76CBDD-196E-46E7-91AC-BD7B7925F7DA}" type="datetimeFigureOut">
               <a:rPr lang="en-US" smtClean="0"/>
-              <a:t>4/19/2022</a:t>
+              <a:t>4/20/2022</a:t>
             </a:fld>
             <a:endParaRPr lang="en-US"/>
           </a:p>
@@ -2658,7 +2691,7 @@
           <a:p>
             <a:fld id="{3C76CBDD-196E-46E7-91AC-BD7B7925F7DA}" type="datetimeFigureOut">
               <a:rPr lang="en-US" smtClean="0"/>
-              <a:t>4/19/2022</a:t>
+              <a:t>4/20/2022</a:t>
             </a:fld>
             <a:endParaRPr lang="en-US"/>
           </a:p>
@@ -3103,7 +3136,7 @@
           <a:p>
             <a:fld id="{3C76CBDD-196E-46E7-91AC-BD7B7925F7DA}" type="datetimeFigureOut">
               <a:rPr lang="en-US" smtClean="0"/>
-              <a:t>4/19/2022</a:t>
+              <a:t>4/20/2022</a:t>
             </a:fld>
             <a:endParaRPr lang="en-US"/>
           </a:p>
@@ -3429,7 +3462,7 @@
           <a:p>
             <a:fld id="{3C76CBDD-196E-46E7-91AC-BD7B7925F7DA}" type="datetimeFigureOut">
               <a:rPr lang="en-US" smtClean="0"/>
-              <a:t>4/19/2022</a:t>
+              <a:t>4/20/2022</a:t>
             </a:fld>
             <a:endParaRPr lang="en-US"/>
           </a:p>
@@ -4716,6 +4749,98 @@
           <p:cNvPr id="2" name="Title 1">
             <a:extLst>
               <a:ext uri="{FF2B5EF4-FFF2-40B4-BE49-F238E27FC236}">
+                <a16:creationId xmlns:a16="http://schemas.microsoft.com/office/drawing/2014/main" id="{1328FB4C-BF32-496F-A899-53BF5F0FD667}"/>
+              </a:ext>
+            </a:extLst>
+          </p:cNvPr>
+          <p:cNvSpPr>
+            <a:spLocks noGrp="1"/>
+          </p:cNvSpPr>
+          <p:nvPr>
+            <p:ph type="title"/>
+          </p:nvPr>
+        </p:nvSpPr>
+        <p:spPr/>
+        <p:txBody>
+          <a:bodyPr/>
+          <a:lstStyle/>
+          <a:p>
+            <a:r>
+              <a:rPr lang="en-US" dirty="0"/>
+              <a:t>Video Time</a:t>
+            </a:r>
+          </a:p>
+        </p:txBody>
+      </p:sp>
+      <p:sp>
+        <p:nvSpPr>
+          <p:cNvPr id="3" name="Content Placeholder 2">
+            <a:extLst>
+              <a:ext uri="{FF2B5EF4-FFF2-40B4-BE49-F238E27FC236}">
+                <a16:creationId xmlns:a16="http://schemas.microsoft.com/office/drawing/2014/main" id="{0E2FD9DE-6E07-422C-8C70-8CC6DDFE4BE8}"/>
+              </a:ext>
+            </a:extLst>
+          </p:cNvPr>
+          <p:cNvSpPr>
+            <a:spLocks noGrp="1"/>
+          </p:cNvSpPr>
+          <p:nvPr>
+            <p:ph idx="1"/>
+          </p:nvPr>
+        </p:nvSpPr>
+        <p:spPr/>
+        <p:txBody>
+          <a:bodyPr/>
+          <a:lstStyle/>
+          <a:p>
+            <a:r>
+              <a:rPr lang="en-US" dirty="0">
+                <a:hlinkClick r:id="rId2"/>
+              </a:rPr>
+              <a:t>https://www.youtube.com/watch?v=gpH8T2CRlLI</a:t>
+            </a:r>
+            <a:endParaRPr lang="en-US" dirty="0"/>
+          </a:p>
+          <a:p>
+            <a:endParaRPr lang="en-US" dirty="0"/>
+          </a:p>
+        </p:txBody>
+      </p:sp>
+    </p:spTree>
+    <p:extLst>
+      <p:ext uri="{BB962C8B-B14F-4D97-AF65-F5344CB8AC3E}">
+        <p14:creationId xmlns:p14="http://schemas.microsoft.com/office/powerpoint/2010/main" val="1805634789"/>
+      </p:ext>
+    </p:extLst>
+  </p:cSld>
+  <p:clrMapOvr>
+    <a:masterClrMapping/>
+  </p:clrMapOvr>
+</p:sld>
+</file>
+
+<file path=ppt/slides/slide9.xml><?xml version="1.0" encoding="utf-8"?>
+<p:sld xmlns:a="http://schemas.openxmlformats.org/drawingml/2006/main" xmlns:r="http://schemas.openxmlformats.org/officeDocument/2006/relationships" xmlns:p="http://schemas.openxmlformats.org/presentationml/2006/main">
+  <p:cSld>
+    <p:spTree>
+      <p:nvGrpSpPr>
+        <p:cNvPr id="1" name=""/>
+        <p:cNvGrpSpPr/>
+        <p:nvPr/>
+      </p:nvGrpSpPr>
+      <p:grpSpPr>
+        <a:xfrm>
+          <a:off x="0" y="0"/>
+          <a:ext cx="0" cy="0"/>
+          <a:chOff x="0" y="0"/>
+          <a:chExt cx="0" cy="0"/>
+        </a:xfrm>
+      </p:grpSpPr>
+      <p:sp>
+        <p:nvSpPr>
+          <p:cNvPr id="2" name="Title 1">
+            <a:extLst>
+              <a:ext uri="{FF2B5EF4-FFF2-40B4-BE49-F238E27FC236}">
                 <a16:creationId xmlns:a16="http://schemas.microsoft.com/office/drawing/2014/main" id="{0AFBF216-166C-4BB4-8F31-116E8DCCA175}"/>
               </a:ext>
             </a:extLst>
@@ -5056,6 +5181,15 @@
 </file>
 
 <file path=customXml/item1.xml><?xml version="1.0" encoding="utf-8"?>
+<?mso-contentType ?>
+<FormTemplates xmlns="http://schemas.microsoft.com/sharepoint/v3/contenttype/forms">
+  <Display>DocumentLibraryForm</Display>
+  <Edit>DocumentLibraryForm</Edit>
+  <New>DocumentLibraryForm</New>
+</FormTemplates>
+</file>
+
+<file path=customXml/item2.xml><?xml version="1.0" encoding="utf-8"?>
 <ct:contentTypeSchema xmlns:ct="http://schemas.microsoft.com/office/2006/metadata/contentType" xmlns:ma="http://schemas.microsoft.com/office/2006/metadata/properties/metaAttributes" ct:_="" ma:_="" ma:contentTypeName="Document" ma:contentTypeID="0x010100651E00D2AC2DD14EB60A774F4411C2DE" ma:contentTypeVersion="10" ma:contentTypeDescription="Create a new document." ma:contentTypeScope="" ma:versionID="5fa4770c7f3533901a642ebc136dfacc">
   <xsd:schema xmlns:xsd="http://www.w3.org/2001/XMLSchema" xmlns:xs="http://www.w3.org/2001/XMLSchema" xmlns:p="http://schemas.microsoft.com/office/2006/metadata/properties" xmlns:ns3="a226a929-813b-4430-a398-5fab01598312" targetNamespace="http://schemas.microsoft.com/office/2006/metadata/properties" ma:root="true" ma:fieldsID="5ce44c3146c3c9503a47426e7c52d1ce" ns3:_="">
     <xsd:import namespace="a226a929-813b-4430-a398-5fab01598312"/>
@@ -5239,15 +5373,6 @@
 </ct:contentTypeSchema>
 </file>
 
-<file path=customXml/item2.xml><?xml version="1.0" encoding="utf-8"?>
-<?mso-contentType ?>
-<FormTemplates xmlns="http://schemas.microsoft.com/sharepoint/v3/contenttype/forms">
-  <Display>DocumentLibraryForm</Display>
-  <Edit>DocumentLibraryForm</Edit>
-  <New>DocumentLibraryForm</New>
-</FormTemplates>
-</file>
-
 <file path=customXml/item3.xml><?xml version="1.0" encoding="utf-8"?>
 <p:properties xmlns:p="http://schemas.microsoft.com/office/2006/metadata/properties" xmlns:xsi="http://www.w3.org/2001/XMLSchema-instance" xmlns:pc="http://schemas.microsoft.com/office/infopath/2007/PartnerControls">
   <documentManagement/>
@@ -5255,6 +5380,14 @@
 </file>
 
 <file path=customXml/itemProps1.xml><?xml version="1.0" encoding="utf-8"?>
+<ds:datastoreItem xmlns:ds="http://schemas.openxmlformats.org/officeDocument/2006/customXml" ds:itemID="{8694C118-9DD4-48B5-853B-60A12CE48C82}">
+  <ds:schemaRefs>
+    <ds:schemaRef ds:uri="http://schemas.microsoft.com/sharepoint/v3/contenttype/forms"/>
+  </ds:schemaRefs>
+</ds:datastoreItem>
+</file>
+
+<file path=customXml/itemProps2.xml><?xml version="1.0" encoding="utf-8"?>
 <ds:datastoreItem xmlns:ds="http://schemas.openxmlformats.org/officeDocument/2006/customXml" ds:itemID="{6EFC1AFC-44DE-4603-B202-61A5938AC440}">
   <ds:schemaRefs>
     <ds:schemaRef ds:uri="http://schemas.microsoft.com/office/2006/metadata/contentType"/>
@@ -5272,26 +5405,18 @@
 </ds:datastoreItem>
 </file>
 
-<file path=customXml/itemProps2.xml><?xml version="1.0" encoding="utf-8"?>
-<ds:datastoreItem xmlns:ds="http://schemas.openxmlformats.org/officeDocument/2006/customXml" ds:itemID="{8694C118-9DD4-48B5-853B-60A12CE48C82}">
-  <ds:schemaRefs>
-    <ds:schemaRef ds:uri="http://schemas.microsoft.com/sharepoint/v3/contenttype/forms"/>
-  </ds:schemaRefs>
-</ds:datastoreItem>
-</file>
-
 <file path=customXml/itemProps3.xml><?xml version="1.0" encoding="utf-8"?>
 <ds:datastoreItem xmlns:ds="http://schemas.openxmlformats.org/officeDocument/2006/customXml" ds:itemID="{E462AC3C-788A-4280-B574-22705F276939}">
   <ds:schemaRefs>
+    <ds:schemaRef ds:uri="http://schemas.microsoft.com/office/2006/metadata/properties"/>
     <ds:schemaRef ds:uri="http://purl.org/dc/terms/"/>
+    <ds:schemaRef ds:uri="http://purl.org/dc/elements/1.1/"/>
     <ds:schemaRef ds:uri="a226a929-813b-4430-a398-5fab01598312"/>
-    <ds:schemaRef ds:uri="http://purl.org/dc/dcmitype/"/>
-    <ds:schemaRef ds:uri="http://schemas.microsoft.com/office/infopath/2007/PartnerControls"/>
     <ds:schemaRef ds:uri="http://www.w3.org/XML/1998/namespace"/>
     <ds:schemaRef ds:uri="http://schemas.microsoft.com/office/2006/documentManagement/types"/>
     <ds:schemaRef ds:uri="http://schemas.openxmlformats.org/package/2006/metadata/core-properties"/>
-    <ds:schemaRef ds:uri="http://purl.org/dc/elements/1.1/"/>
-    <ds:schemaRef ds:uri="http://schemas.microsoft.com/office/2006/metadata/properties"/>
+    <ds:schemaRef ds:uri="http://schemas.microsoft.com/office/infopath/2007/PartnerControls"/>
+    <ds:schemaRef ds:uri="http://purl.org/dc/dcmitype/"/>
   </ds:schemaRefs>
 </ds:datastoreItem>
 </file>
</xml_diff>